<commit_message>
Relist functions in order of operations
</commit_message>
<xml_diff>
--- a/data-raw/Presentation1.pptx
+++ b/data-raw/Presentation1.pptx
@@ -272,7 +272,7 @@
           <a:p>
             <a:fld id="{1BE45AD0-3B32-4E16-B1FE-F0B99A147BDE}" type="datetimeFigureOut">
               <a:rPr lang="en-GB" smtClean="0"/>
-              <a:t>2023-03-25</a:t>
+              <a:t>15/06/2023</a:t>
             </a:fld>
             <a:endParaRPr lang="en-GB"/>
           </a:p>
@@ -472,7 +472,7 @@
           <a:p>
             <a:fld id="{1BE45AD0-3B32-4E16-B1FE-F0B99A147BDE}" type="datetimeFigureOut">
               <a:rPr lang="en-GB" smtClean="0"/>
-              <a:t>2023-03-25</a:t>
+              <a:t>15/06/2023</a:t>
             </a:fld>
             <a:endParaRPr lang="en-GB"/>
           </a:p>
@@ -682,7 +682,7 @@
           <a:p>
             <a:fld id="{1BE45AD0-3B32-4E16-B1FE-F0B99A147BDE}" type="datetimeFigureOut">
               <a:rPr lang="en-GB" smtClean="0"/>
-              <a:t>2023-03-25</a:t>
+              <a:t>15/06/2023</a:t>
             </a:fld>
             <a:endParaRPr lang="en-GB"/>
           </a:p>
@@ -882,7 +882,7 @@
           <a:p>
             <a:fld id="{1BE45AD0-3B32-4E16-B1FE-F0B99A147BDE}" type="datetimeFigureOut">
               <a:rPr lang="en-GB" smtClean="0"/>
-              <a:t>2023-03-25</a:t>
+              <a:t>15/06/2023</a:t>
             </a:fld>
             <a:endParaRPr lang="en-GB"/>
           </a:p>
@@ -1158,7 +1158,7 @@
           <a:p>
             <a:fld id="{1BE45AD0-3B32-4E16-B1FE-F0B99A147BDE}" type="datetimeFigureOut">
               <a:rPr lang="en-GB" smtClean="0"/>
-              <a:t>2023-03-25</a:t>
+              <a:t>15/06/2023</a:t>
             </a:fld>
             <a:endParaRPr lang="en-GB"/>
           </a:p>
@@ -1426,7 +1426,7 @@
           <a:p>
             <a:fld id="{1BE45AD0-3B32-4E16-B1FE-F0B99A147BDE}" type="datetimeFigureOut">
               <a:rPr lang="en-GB" smtClean="0"/>
-              <a:t>2023-03-25</a:t>
+              <a:t>15/06/2023</a:t>
             </a:fld>
             <a:endParaRPr lang="en-GB"/>
           </a:p>
@@ -1841,7 +1841,7 @@
           <a:p>
             <a:fld id="{1BE45AD0-3B32-4E16-B1FE-F0B99A147BDE}" type="datetimeFigureOut">
               <a:rPr lang="en-GB" smtClean="0"/>
-              <a:t>2023-03-25</a:t>
+              <a:t>15/06/2023</a:t>
             </a:fld>
             <a:endParaRPr lang="en-GB"/>
           </a:p>
@@ -1983,7 +1983,7 @@
           <a:p>
             <a:fld id="{1BE45AD0-3B32-4E16-B1FE-F0B99A147BDE}" type="datetimeFigureOut">
               <a:rPr lang="en-GB" smtClean="0"/>
-              <a:t>2023-03-25</a:t>
+              <a:t>15/06/2023</a:t>
             </a:fld>
             <a:endParaRPr lang="en-GB"/>
           </a:p>
@@ -2096,7 +2096,7 @@
           <a:p>
             <a:fld id="{1BE45AD0-3B32-4E16-B1FE-F0B99A147BDE}" type="datetimeFigureOut">
               <a:rPr lang="en-GB" smtClean="0"/>
-              <a:t>2023-03-25</a:t>
+              <a:t>15/06/2023</a:t>
             </a:fld>
             <a:endParaRPr lang="en-GB"/>
           </a:p>
@@ -2409,7 +2409,7 @@
           <a:p>
             <a:fld id="{1BE45AD0-3B32-4E16-B1FE-F0B99A147BDE}" type="datetimeFigureOut">
               <a:rPr lang="en-GB" smtClean="0"/>
-              <a:t>2023-03-25</a:t>
+              <a:t>15/06/2023</a:t>
             </a:fld>
             <a:endParaRPr lang="en-GB"/>
           </a:p>
@@ -2698,7 +2698,7 @@
           <a:p>
             <a:fld id="{1BE45AD0-3B32-4E16-B1FE-F0B99A147BDE}" type="datetimeFigureOut">
               <a:rPr lang="en-GB" smtClean="0"/>
-              <a:t>2023-03-25</a:t>
+              <a:t>15/06/2023</a:t>
             </a:fld>
             <a:endParaRPr lang="en-GB"/>
           </a:p>
@@ -2941,7 +2941,7 @@
           <a:p>
             <a:fld id="{1BE45AD0-3B32-4E16-B1FE-F0B99A147BDE}" type="datetimeFigureOut">
               <a:rPr lang="en-GB" smtClean="0"/>
-              <a:t>2023-03-25</a:t>
+              <a:t>15/06/2023</a:t>
             </a:fld>
             <a:endParaRPr lang="en-GB"/>
           </a:p>
@@ -4419,6 +4419,47 @@
           <a:lstStyle/>
           <a:p>
             <a:r>
+              <a:rPr lang="en-GB" dirty="0">
+                <a:latin typeface="Hack" panose="020B0609030202020204" pitchFamily="49" charset="0"/>
+                <a:ea typeface="Hack" panose="020B0609030202020204" pitchFamily="49" charset="0"/>
+                <a:cs typeface="Hack" panose="020B0609030202020204" pitchFamily="49" charset="0"/>
+              </a:rPr>
+              <a:t>1. </a:t>
+            </a:r>
+            <a:r>
+              <a:rPr lang="en-GB" dirty="0" err="1">
+                <a:latin typeface="Hack" panose="020B0609030202020204" pitchFamily="49" charset="0"/>
+                <a:ea typeface="Hack" panose="020B0609030202020204" pitchFamily="49" charset="0"/>
+                <a:cs typeface="Hack" panose="020B0609030202020204" pitchFamily="49" charset="0"/>
+              </a:rPr>
+              <a:t>factorise_with_dictionary</a:t>
+            </a:r>
+            <a:r>
+              <a:rPr lang="en-GB" dirty="0">
+                <a:latin typeface="Hack" panose="020B0609030202020204" pitchFamily="49" charset="0"/>
+                <a:ea typeface="Hack" panose="020B0609030202020204" pitchFamily="49" charset="0"/>
+                <a:cs typeface="Hack" panose="020B0609030202020204" pitchFamily="49" charset="0"/>
+              </a:rPr>
+              <a:t>() </a:t>
+            </a:r>
+          </a:p>
+          <a:p>
+            <a:endParaRPr lang="en-GB" dirty="0">
+              <a:latin typeface="Hack" panose="020B0609030202020204" pitchFamily="49" charset="0"/>
+              <a:ea typeface="Hack" panose="020B0609030202020204" pitchFamily="49" charset="0"/>
+              <a:cs typeface="Hack" panose="020B0609030202020204" pitchFamily="49" charset="0"/>
+            </a:endParaRPr>
+          </a:p>
+          <a:p>
+            <a:r>
+              <a:rPr lang="en-GB" dirty="0">
+                <a:latin typeface="Hack" panose="020B0609030202020204" pitchFamily="49" charset="0"/>
+                <a:ea typeface="Hack" panose="020B0609030202020204" pitchFamily="49" charset="0"/>
+                <a:cs typeface="Hack" panose="020B0609030202020204" pitchFamily="49" charset="0"/>
+              </a:rPr>
+              <a:t>2. </a:t>
+            </a:r>
+            <a:r>
               <a:rPr lang="en-GB" dirty="0" err="1">
                 <a:latin typeface="Hack" panose="020B0609030202020204" pitchFamily="49" charset="0"/>
                 <a:ea typeface="Hack" panose="020B0609030202020204" pitchFamily="49" charset="0"/>
@@ -4449,42 +4490,20 @@
               </a:rPr>
             </a:br>
             <a:r>
+              <a:rPr lang="en-GB" dirty="0">
+                <a:latin typeface="Hack" panose="020B0609030202020204" pitchFamily="49" charset="0"/>
+                <a:ea typeface="Hack" panose="020B0609030202020204" pitchFamily="49" charset="0"/>
+                <a:cs typeface="Hack" panose="020B0609030202020204" pitchFamily="49" charset="0"/>
+              </a:rPr>
+              <a:t>3. </a:t>
+            </a:r>
+            <a:r>
               <a:rPr lang="en-GB" dirty="0" err="1">
                 <a:latin typeface="Hack" panose="020B0609030202020204" pitchFamily="49" charset="0"/>
                 <a:ea typeface="Hack" panose="020B0609030202020204" pitchFamily="49" charset="0"/>
                 <a:cs typeface="Hack" panose="020B0609030202020204" pitchFamily="49" charset="0"/>
               </a:rPr>
               <a:t>rename_with_dictionary</a:t>
-            </a:r>
-            <a:r>
-              <a:rPr lang="en-GB" dirty="0">
-                <a:latin typeface="Hack" panose="020B0609030202020204" pitchFamily="49" charset="0"/>
-                <a:ea typeface="Hack" panose="020B0609030202020204" pitchFamily="49" charset="0"/>
-                <a:cs typeface="Hack" panose="020B0609030202020204" pitchFamily="49" charset="0"/>
-              </a:rPr>
-              <a:t>()</a:t>
-            </a:r>
-            <a:br>
-              <a:rPr lang="en-GB" dirty="0">
-                <a:latin typeface="Hack" panose="020B0609030202020204" pitchFamily="49" charset="0"/>
-                <a:ea typeface="Hack" panose="020B0609030202020204" pitchFamily="49" charset="0"/>
-                <a:cs typeface="Hack" panose="020B0609030202020204" pitchFamily="49" charset="0"/>
-              </a:rPr>
-            </a:br>
-            <a:br>
-              <a:rPr lang="en-GB" dirty="0">
-                <a:latin typeface="Hack" panose="020B0609030202020204" pitchFamily="49" charset="0"/>
-                <a:ea typeface="Hack" panose="020B0609030202020204" pitchFamily="49" charset="0"/>
-                <a:cs typeface="Hack" panose="020B0609030202020204" pitchFamily="49" charset="0"/>
-              </a:rPr>
-            </a:br>
-            <a:r>
-              <a:rPr lang="en-GB" dirty="0" err="1">
-                <a:latin typeface="Hack" panose="020B0609030202020204" pitchFamily="49" charset="0"/>
-                <a:ea typeface="Hack" panose="020B0609030202020204" pitchFamily="49" charset="0"/>
-                <a:cs typeface="Hack" panose="020B0609030202020204" pitchFamily="49" charset="0"/>
-              </a:rPr>
-              <a:t>factorise_with_dictionary</a:t>
             </a:r>
             <a:r>
               <a:rPr lang="en-GB" dirty="0">

</xml_diff>

<commit_message>
Update factor_file columns in diagram
</commit_message>
<xml_diff>
--- a/data-raw/Presentation1.pptx
+++ b/data-raw/Presentation1.pptx
@@ -3756,7 +3756,7 @@
           <p:nvPr>
             <p:extLst>
               <p:ext uri="{D42A27DB-BD31-4B8C-83A1-F6EECF244321}">
-                <p14:modId xmlns:p14="http://schemas.microsoft.com/office/powerpoint/2010/main" val="3762187134"/>
+                <p14:modId xmlns:p14="http://schemas.microsoft.com/office/powerpoint/2010/main" val="1358069788"/>
               </p:ext>
             </p:extLst>
           </p:nvPr>
@@ -3803,7 +3803,7 @@
                       <a:pPr algn="ctr"/>
                       <a:r>
                         <a:rPr lang="en-GB" sz="900" dirty="0"/>
-                        <a:t>level</a:t>
+                        <a:t>levels</a:t>
                       </a:r>
                     </a:p>
                   </a:txBody>
@@ -3817,7 +3817,7 @@
                       <a:pPr algn="ctr"/>
                       <a:r>
                         <a:rPr lang="en-GB" sz="900" dirty="0"/>
-                        <a:t>label</a:t>
+                        <a:t>labels</a:t>
                       </a:r>
                     </a:p>
                   </a:txBody>
@@ -4062,7 +4062,7 @@
           <p:nvPr>
             <p:extLst>
               <p:ext uri="{D42A27DB-BD31-4B8C-83A1-F6EECF244321}">
-                <p14:modId xmlns:p14="http://schemas.microsoft.com/office/powerpoint/2010/main" val="365519847"/>
+                <p14:modId xmlns:p14="http://schemas.microsoft.com/office/powerpoint/2010/main" val="2424371303"/>
               </p:ext>
             </p:extLst>
           </p:nvPr>
@@ -4108,9 +4108,10 @@
                     <a:p>
                       <a:pPr algn="ctr"/>
                       <a:r>
-                        <a:rPr lang="en-GB" sz="900" dirty="0"/>
-                        <a:t>level</a:t>
+                        <a:rPr lang="en-GB" sz="900"/>
+                        <a:t>levels</a:t>
                       </a:r>
+                      <a:endParaRPr lang="en-GB" sz="900" dirty="0"/>
                     </a:p>
                   </a:txBody>
                   <a:tcPr anchor="ctr"/>
@@ -4123,7 +4124,7 @@
                       <a:pPr algn="ctr"/>
                       <a:r>
                         <a:rPr lang="en-GB" sz="900" dirty="0"/>
-                        <a:t>label</a:t>
+                        <a:t>labels</a:t>
                       </a:r>
                     </a:p>
                   </a:txBody>

</xml_diff>

<commit_message>
Add 'exclude' cols to diagram
</commit_message>
<xml_diff>
--- a/data-raw/Presentation1.pptx
+++ b/data-raw/Presentation1.pptx
@@ -272,7 +272,7 @@
           <a:p>
             <a:fld id="{1BE45AD0-3B32-4E16-B1FE-F0B99A147BDE}" type="datetimeFigureOut">
               <a:rPr lang="en-GB" smtClean="0"/>
-              <a:t>15/06/2023</a:t>
+              <a:t>22/06/2023</a:t>
             </a:fld>
             <a:endParaRPr lang="en-GB"/>
           </a:p>
@@ -472,7 +472,7 @@
           <a:p>
             <a:fld id="{1BE45AD0-3B32-4E16-B1FE-F0B99A147BDE}" type="datetimeFigureOut">
               <a:rPr lang="en-GB" smtClean="0"/>
-              <a:t>15/06/2023</a:t>
+              <a:t>22/06/2023</a:t>
             </a:fld>
             <a:endParaRPr lang="en-GB"/>
           </a:p>
@@ -682,7 +682,7 @@
           <a:p>
             <a:fld id="{1BE45AD0-3B32-4E16-B1FE-F0B99A147BDE}" type="datetimeFigureOut">
               <a:rPr lang="en-GB" smtClean="0"/>
-              <a:t>15/06/2023</a:t>
+              <a:t>22/06/2023</a:t>
             </a:fld>
             <a:endParaRPr lang="en-GB"/>
           </a:p>
@@ -882,7 +882,7 @@
           <a:p>
             <a:fld id="{1BE45AD0-3B32-4E16-B1FE-F0B99A147BDE}" type="datetimeFigureOut">
               <a:rPr lang="en-GB" smtClean="0"/>
-              <a:t>15/06/2023</a:t>
+              <a:t>22/06/2023</a:t>
             </a:fld>
             <a:endParaRPr lang="en-GB"/>
           </a:p>
@@ -1158,7 +1158,7 @@
           <a:p>
             <a:fld id="{1BE45AD0-3B32-4E16-B1FE-F0B99A147BDE}" type="datetimeFigureOut">
               <a:rPr lang="en-GB" smtClean="0"/>
-              <a:t>15/06/2023</a:t>
+              <a:t>22/06/2023</a:t>
             </a:fld>
             <a:endParaRPr lang="en-GB"/>
           </a:p>
@@ -1426,7 +1426,7 @@
           <a:p>
             <a:fld id="{1BE45AD0-3B32-4E16-B1FE-F0B99A147BDE}" type="datetimeFigureOut">
               <a:rPr lang="en-GB" smtClean="0"/>
-              <a:t>15/06/2023</a:t>
+              <a:t>22/06/2023</a:t>
             </a:fld>
             <a:endParaRPr lang="en-GB"/>
           </a:p>
@@ -1841,7 +1841,7 @@
           <a:p>
             <a:fld id="{1BE45AD0-3B32-4E16-B1FE-F0B99A147BDE}" type="datetimeFigureOut">
               <a:rPr lang="en-GB" smtClean="0"/>
-              <a:t>15/06/2023</a:t>
+              <a:t>22/06/2023</a:t>
             </a:fld>
             <a:endParaRPr lang="en-GB"/>
           </a:p>
@@ -1983,7 +1983,7 @@
           <a:p>
             <a:fld id="{1BE45AD0-3B32-4E16-B1FE-F0B99A147BDE}" type="datetimeFigureOut">
               <a:rPr lang="en-GB" smtClean="0"/>
-              <a:t>15/06/2023</a:t>
+              <a:t>22/06/2023</a:t>
             </a:fld>
             <a:endParaRPr lang="en-GB"/>
           </a:p>
@@ -2096,7 +2096,7 @@
           <a:p>
             <a:fld id="{1BE45AD0-3B32-4E16-B1FE-F0B99A147BDE}" type="datetimeFigureOut">
               <a:rPr lang="en-GB" smtClean="0"/>
-              <a:t>15/06/2023</a:t>
+              <a:t>22/06/2023</a:t>
             </a:fld>
             <a:endParaRPr lang="en-GB"/>
           </a:p>
@@ -2409,7 +2409,7 @@
           <a:p>
             <a:fld id="{1BE45AD0-3B32-4E16-B1FE-F0B99A147BDE}" type="datetimeFigureOut">
               <a:rPr lang="en-GB" smtClean="0"/>
-              <a:t>15/06/2023</a:t>
+              <a:t>22/06/2023</a:t>
             </a:fld>
             <a:endParaRPr lang="en-GB"/>
           </a:p>
@@ -2698,7 +2698,7 @@
           <a:p>
             <a:fld id="{1BE45AD0-3B32-4E16-B1FE-F0B99A147BDE}" type="datetimeFigureOut">
               <a:rPr lang="en-GB" smtClean="0"/>
-              <a:t>15/06/2023</a:t>
+              <a:t>22/06/2023</a:t>
             </a:fld>
             <a:endParaRPr lang="en-GB"/>
           </a:p>
@@ -2941,7 +2941,7 @@
           <a:p>
             <a:fld id="{1BE45AD0-3B32-4E16-B1FE-F0B99A147BDE}" type="datetimeFigureOut">
               <a:rPr lang="en-GB" smtClean="0"/>
-              <a:t>15/06/2023</a:t>
+              <a:t>22/06/2023</a:t>
             </a:fld>
             <a:endParaRPr lang="en-GB"/>
           </a:p>
@@ -3756,14 +3756,14 @@
           <p:nvPr>
             <p:extLst>
               <p:ext uri="{D42A27DB-BD31-4B8C-83A1-F6EECF244321}">
-                <p14:modId xmlns:p14="http://schemas.microsoft.com/office/powerpoint/2010/main" val="1358069788"/>
+                <p14:modId xmlns:p14="http://schemas.microsoft.com/office/powerpoint/2010/main" val="2496454216"/>
               </p:ext>
             </p:extLst>
           </p:nvPr>
         </p:nvGraphicFramePr>
         <p:xfrm>
-          <a:off x="6651802" y="233673"/>
-          <a:ext cx="1800000" cy="1800000"/>
+          <a:off x="6651799" y="233673"/>
+          <a:ext cx="2265864" cy="1800000"/>
         </p:xfrm>
         <a:graphic>
           <a:graphicData uri="http://schemas.openxmlformats.org/drawingml/2006/table">
@@ -3772,27 +3772,34 @@
                 <a:tableStyleId>{5C22544A-7EE6-4342-B048-85BDC9FD1C3A}</a:tableStyleId>
               </a:tblPr>
               <a:tblGrid>
-                <a:gridCol w="600000">
+                <a:gridCol w="566466">
                   <a:extLst>
                     <a:ext uri="{9D8B030D-6E8A-4147-A177-3AD203B41FA5}">
                       <a16:colId xmlns:a16="http://schemas.microsoft.com/office/drawing/2014/main" val="780488510"/>
                     </a:ext>
                   </a:extLst>
                 </a:gridCol>
-                <a:gridCol w="600000">
+                <a:gridCol w="566466">
                   <a:extLst>
                     <a:ext uri="{9D8B030D-6E8A-4147-A177-3AD203B41FA5}">
                       <a16:colId xmlns:a16="http://schemas.microsoft.com/office/drawing/2014/main" val="2028389368"/>
                     </a:ext>
                   </a:extLst>
                 </a:gridCol>
-                <a:gridCol w="600000">
+                <a:gridCol w="566466">
                   <a:extLst>
                     <a:ext uri="{9D8B030D-6E8A-4147-A177-3AD203B41FA5}">
                       <a16:colId xmlns:a16="http://schemas.microsoft.com/office/drawing/2014/main" val="2876044090"/>
                     </a:ext>
                   </a:extLst>
                 </a:gridCol>
+                <a:gridCol w="566466">
+                  <a:extLst>
+                    <a:ext uri="{9D8B030D-6E8A-4147-A177-3AD203B41FA5}">
+                      <a16:colId xmlns:a16="http://schemas.microsoft.com/office/drawing/2014/main" val="236608661"/>
+                    </a:ext>
+                  </a:extLst>
+                </a:gridCol>
               </a:tblGrid>
               <a:tr h="300000">
                 <a:tc>
@@ -3832,6 +3839,20 @@
                       <a:r>
                         <a:rPr lang="en-GB" sz="900" dirty="0"/>
                         <a:t>ordered</a:t>
+                      </a:r>
+                    </a:p>
+                  </a:txBody>
+                  <a:tcPr anchor="ctr"/>
+                </a:tc>
+                <a:tc>
+                  <a:txBody>
+                    <a:bodyPr/>
+                    <a:lstStyle/>
+                    <a:p>
+                      <a:pPr algn="ctr"/>
+                      <a:r>
+                        <a:rPr lang="en-GB" sz="900" dirty="0"/>
+                        <a:t>exclude</a:t>
                       </a:r>
                     </a:p>
                   </a:txBody>
@@ -3877,6 +3898,17 @@
                   </a:txBody>
                   <a:tcPr anchor="ctr"/>
                 </a:tc>
+                <a:tc>
+                  <a:txBody>
+                    <a:bodyPr/>
+                    <a:lstStyle/>
+                    <a:p>
+                      <a:pPr algn="ctr"/>
+                      <a:endParaRPr lang="en-GB" sz="900"/>
+                    </a:p>
+                  </a:txBody>
+                  <a:tcPr anchor="ctr"/>
+                </a:tc>
                 <a:extLst>
                   <a:ext uri="{0D108BD9-81ED-4DB2-BD59-A6C34878D82A}">
                     <a16:rowId xmlns:a16="http://schemas.microsoft.com/office/drawing/2014/main" val="2044767482"/>
@@ -3917,6 +3949,17 @@
                   </a:txBody>
                   <a:tcPr anchor="ctr"/>
                 </a:tc>
+                <a:tc>
+                  <a:txBody>
+                    <a:bodyPr/>
+                    <a:lstStyle/>
+                    <a:p>
+                      <a:pPr algn="ctr"/>
+                      <a:endParaRPr lang="en-GB" sz="900"/>
+                    </a:p>
+                  </a:txBody>
+                  <a:tcPr anchor="ctr"/>
+                </a:tc>
                 <a:extLst>
                   <a:ext uri="{0D108BD9-81ED-4DB2-BD59-A6C34878D82A}">
                     <a16:rowId xmlns:a16="http://schemas.microsoft.com/office/drawing/2014/main" val="2272863491"/>
@@ -3957,6 +4000,17 @@
                   </a:txBody>
                   <a:tcPr anchor="ctr"/>
                 </a:tc>
+                <a:tc>
+                  <a:txBody>
+                    <a:bodyPr/>
+                    <a:lstStyle/>
+                    <a:p>
+                      <a:pPr algn="ctr"/>
+                      <a:endParaRPr lang="en-GB" sz="900"/>
+                    </a:p>
+                  </a:txBody>
+                  <a:tcPr anchor="ctr"/>
+                </a:tc>
                 <a:extLst>
                   <a:ext uri="{0D108BD9-81ED-4DB2-BD59-A6C34878D82A}">
                     <a16:rowId xmlns:a16="http://schemas.microsoft.com/office/drawing/2014/main" val="650044913"/>
@@ -3997,6 +4051,17 @@
                   </a:txBody>
                   <a:tcPr anchor="ctr"/>
                 </a:tc>
+                <a:tc>
+                  <a:txBody>
+                    <a:bodyPr/>
+                    <a:lstStyle/>
+                    <a:p>
+                      <a:pPr algn="ctr"/>
+                      <a:endParaRPr lang="en-GB" sz="900"/>
+                    </a:p>
+                  </a:txBody>
+                  <a:tcPr anchor="ctr"/>
+                </a:tc>
                 <a:extLst>
                   <a:ext uri="{0D108BD9-81ED-4DB2-BD59-A6C34878D82A}">
                     <a16:rowId xmlns:a16="http://schemas.microsoft.com/office/drawing/2014/main" val="30626102"/>
@@ -4011,6 +4076,17 @@
                     <a:p>
                       <a:pPr algn="ctr"/>
                       <a:endParaRPr lang="en-GB" sz="900"/>
+                    </a:p>
+                  </a:txBody>
+                  <a:tcPr anchor="ctr"/>
+                </a:tc>
+                <a:tc>
+                  <a:txBody>
+                    <a:bodyPr/>
+                    <a:lstStyle/>
+                    <a:p>
+                      <a:pPr algn="ctr"/>
+                      <a:endParaRPr lang="en-GB" sz="900" dirty="0"/>
                     </a:p>
                   </a:txBody>
                   <a:tcPr anchor="ctr"/>
@@ -4062,14 +4138,14 @@
           <p:nvPr>
             <p:extLst>
               <p:ext uri="{D42A27DB-BD31-4B8C-83A1-F6EECF244321}">
-                <p14:modId xmlns:p14="http://schemas.microsoft.com/office/powerpoint/2010/main" val="2424371303"/>
+                <p14:modId xmlns:p14="http://schemas.microsoft.com/office/powerpoint/2010/main" val="1498710372"/>
               </p:ext>
             </p:extLst>
           </p:nvPr>
         </p:nvGraphicFramePr>
         <p:xfrm>
-          <a:off x="6651802" y="2346303"/>
-          <a:ext cx="1800000" cy="1200000"/>
+          <a:off x="6651801" y="2346303"/>
+          <a:ext cx="2265860" cy="1200000"/>
         </p:xfrm>
         <a:graphic>
           <a:graphicData uri="http://schemas.openxmlformats.org/drawingml/2006/table">
@@ -4078,27 +4154,34 @@
                 <a:tableStyleId>{93296810-A885-4BE3-A3E7-6D5BEEA58F35}</a:tableStyleId>
               </a:tblPr>
               <a:tblGrid>
-                <a:gridCol w="600000">
+                <a:gridCol w="566465">
                   <a:extLst>
                     <a:ext uri="{9D8B030D-6E8A-4147-A177-3AD203B41FA5}">
                       <a16:colId xmlns:a16="http://schemas.microsoft.com/office/drawing/2014/main" val="780488510"/>
                     </a:ext>
                   </a:extLst>
                 </a:gridCol>
-                <a:gridCol w="600000">
+                <a:gridCol w="566465">
                   <a:extLst>
                     <a:ext uri="{9D8B030D-6E8A-4147-A177-3AD203B41FA5}">
                       <a16:colId xmlns:a16="http://schemas.microsoft.com/office/drawing/2014/main" val="2028389368"/>
                     </a:ext>
                   </a:extLst>
                 </a:gridCol>
-                <a:gridCol w="600000">
+                <a:gridCol w="566465">
                   <a:extLst>
                     <a:ext uri="{9D8B030D-6E8A-4147-A177-3AD203B41FA5}">
                       <a16:colId xmlns:a16="http://schemas.microsoft.com/office/drawing/2014/main" val="2876044090"/>
                     </a:ext>
                   </a:extLst>
                 </a:gridCol>
+                <a:gridCol w="566465">
+                  <a:extLst>
+                    <a:ext uri="{9D8B030D-6E8A-4147-A177-3AD203B41FA5}">
+                      <a16:colId xmlns:a16="http://schemas.microsoft.com/office/drawing/2014/main" val="611565195"/>
+                    </a:ext>
+                  </a:extLst>
+                </a:gridCol>
               </a:tblGrid>
               <a:tr h="300000">
                 <a:tc>
@@ -4139,6 +4222,20 @@
                       <a:r>
                         <a:rPr lang="en-GB" sz="900" dirty="0"/>
                         <a:t>ordered</a:t>
+                      </a:r>
+                    </a:p>
+                  </a:txBody>
+                  <a:tcPr anchor="ctr"/>
+                </a:tc>
+                <a:tc>
+                  <a:txBody>
+                    <a:bodyPr/>
+                    <a:lstStyle/>
+                    <a:p>
+                      <a:pPr algn="ctr"/>
+                      <a:r>
+                        <a:rPr lang="en-GB" sz="900" dirty="0"/>
+                        <a:t>exclude</a:t>
                       </a:r>
                     </a:p>
                   </a:txBody>
@@ -4179,7 +4276,18 @@
                     <a:lstStyle/>
                     <a:p>
                       <a:pPr algn="ctr"/>
-                      <a:endParaRPr lang="en-GB" sz="900"/>
+                      <a:endParaRPr lang="en-GB" sz="900" dirty="0"/>
+                    </a:p>
+                  </a:txBody>
+                  <a:tcPr anchor="ctr"/>
+                </a:tc>
+                <a:tc>
+                  <a:txBody>
+                    <a:bodyPr/>
+                    <a:lstStyle/>
+                    <a:p>
+                      <a:pPr algn="ctr"/>
+                      <a:endParaRPr lang="en-GB" sz="900" dirty="0"/>
                     </a:p>
                   </a:txBody>
                   <a:tcPr anchor="ctr"/>
@@ -4224,6 +4332,17 @@
                   </a:txBody>
                   <a:tcPr anchor="ctr"/>
                 </a:tc>
+                <a:tc>
+                  <a:txBody>
+                    <a:bodyPr/>
+                    <a:lstStyle/>
+                    <a:p>
+                      <a:pPr algn="ctr"/>
+                      <a:endParaRPr lang="en-GB" sz="900"/>
+                    </a:p>
+                  </a:txBody>
+                  <a:tcPr anchor="ctr"/>
+                </a:tc>
                 <a:extLst>
                   <a:ext uri="{0D108BD9-81ED-4DB2-BD59-A6C34878D82A}">
                     <a16:rowId xmlns:a16="http://schemas.microsoft.com/office/drawing/2014/main" val="2272863491"/>
@@ -4249,6 +4368,17 @@
                     <a:p>
                       <a:pPr algn="ctr"/>
                       <a:endParaRPr lang="en-GB" sz="900"/>
+                    </a:p>
+                  </a:txBody>
+                  <a:tcPr anchor="ctr"/>
+                </a:tc>
+                <a:tc>
+                  <a:txBody>
+                    <a:bodyPr/>
+                    <a:lstStyle/>
+                    <a:p>
+                      <a:pPr algn="ctr"/>
+                      <a:endParaRPr lang="en-GB" sz="900" dirty="0"/>
                     </a:p>
                   </a:txBody>
                   <a:tcPr anchor="ctr"/>

</xml_diff>